<commit_message>
completing making azure loading notifications issues #105 and #99
</commit_message>
<xml_diff>
--- a/Diagrams.pptx
+++ b/Diagrams.pptx
@@ -6,7 +6,8 @@
   </p:sldMasterIdLst>
   <p:sldIdLst>
     <p:sldId id="258" r:id="rId2"/>
-    <p:sldId id="257" r:id="rId3"/>
+    <p:sldId id="259" r:id="rId3"/>
+    <p:sldId id="257" r:id="rId4"/>
   </p:sldIdLst>
   <p:sldSz cx="12192000" cy="6858000"/>
   <p:notesSz cx="6858000" cy="9144000"/>
@@ -298,7 +299,7 @@
           <a:p>
             <a:fld id="{2C1C4E54-FC0F-46DC-9CC8-DAD5290F7686}" type="datetimeFigureOut">
               <a:rPr lang="en-US" smtClean="0"/>
-              <a:t>1/17/2020</a:t>
+              <a:t>1/29/2020</a:t>
             </a:fld>
             <a:endParaRPr lang="en-US"/>
           </a:p>
@@ -596,7 +597,7 @@
           <a:p>
             <a:fld id="{2C1C4E54-FC0F-46DC-9CC8-DAD5290F7686}" type="datetimeFigureOut">
               <a:rPr lang="en-US" smtClean="0"/>
-              <a:t>1/17/2020</a:t>
+              <a:t>1/29/2020</a:t>
             </a:fld>
             <a:endParaRPr lang="en-US"/>
           </a:p>
@@ -788,7 +789,7 @@
           <a:p>
             <a:fld id="{2C1C4E54-FC0F-46DC-9CC8-DAD5290F7686}" type="datetimeFigureOut">
               <a:rPr lang="en-US" smtClean="0"/>
-              <a:t>1/17/2020</a:t>
+              <a:t>1/29/2020</a:t>
             </a:fld>
             <a:endParaRPr lang="en-US"/>
           </a:p>
@@ -1049,7 +1050,7 @@
           <a:p>
             <a:fld id="{2C1C4E54-FC0F-46DC-9CC8-DAD5290F7686}" type="datetimeFigureOut">
               <a:rPr lang="en-US" smtClean="0"/>
-              <a:t>1/17/2020</a:t>
+              <a:t>1/29/2020</a:t>
             </a:fld>
             <a:endParaRPr lang="en-US"/>
           </a:p>
@@ -1473,7 +1474,7 @@
           <a:p>
             <a:fld id="{2C1C4E54-FC0F-46DC-9CC8-DAD5290F7686}" type="datetimeFigureOut">
               <a:rPr lang="en-US" smtClean="0"/>
-              <a:t>1/17/2020</a:t>
+              <a:t>1/29/2020</a:t>
             </a:fld>
             <a:endParaRPr lang="en-US"/>
           </a:p>
@@ -2010,7 +2011,7 @@
           <a:p>
             <a:fld id="{2C1C4E54-FC0F-46DC-9CC8-DAD5290F7686}" type="datetimeFigureOut">
               <a:rPr lang="en-US" smtClean="0"/>
-              <a:t>1/17/2020</a:t>
+              <a:t>1/29/2020</a:t>
             </a:fld>
             <a:endParaRPr lang="en-US"/>
           </a:p>
@@ -2874,7 +2875,7 @@
           <a:p>
             <a:fld id="{2C1C4E54-FC0F-46DC-9CC8-DAD5290F7686}" type="datetimeFigureOut">
               <a:rPr lang="en-US" smtClean="0"/>
-              <a:t>1/17/2020</a:t>
+              <a:t>1/29/2020</a:t>
             </a:fld>
             <a:endParaRPr lang="en-US"/>
           </a:p>
@@ -3044,7 +3045,7 @@
           <a:p>
             <a:fld id="{2C1C4E54-FC0F-46DC-9CC8-DAD5290F7686}" type="datetimeFigureOut">
               <a:rPr lang="en-US" smtClean="0"/>
-              <a:t>1/17/2020</a:t>
+              <a:t>1/29/2020</a:t>
             </a:fld>
             <a:endParaRPr lang="en-US"/>
           </a:p>
@@ -3228,7 +3229,7 @@
           <a:p>
             <a:fld id="{2C1C4E54-FC0F-46DC-9CC8-DAD5290F7686}" type="datetimeFigureOut">
               <a:rPr lang="en-US" smtClean="0"/>
-              <a:t>1/17/2020</a:t>
+              <a:t>1/29/2020</a:t>
             </a:fld>
             <a:endParaRPr lang="en-US"/>
           </a:p>
@@ -3398,7 +3399,7 @@
           <a:p>
             <a:fld id="{2C1C4E54-FC0F-46DC-9CC8-DAD5290F7686}" type="datetimeFigureOut">
               <a:rPr lang="en-US" smtClean="0"/>
-              <a:t>1/17/2020</a:t>
+              <a:t>1/29/2020</a:t>
             </a:fld>
             <a:endParaRPr lang="en-US"/>
           </a:p>
@@ -3642,7 +3643,7 @@
           <a:p>
             <a:fld id="{2C1C4E54-FC0F-46DC-9CC8-DAD5290F7686}" type="datetimeFigureOut">
               <a:rPr lang="en-US" smtClean="0"/>
-              <a:t>1/17/2020</a:t>
+              <a:t>1/29/2020</a:t>
             </a:fld>
             <a:endParaRPr lang="en-US"/>
           </a:p>
@@ -3878,7 +3879,7 @@
           <a:p>
             <a:fld id="{2C1C4E54-FC0F-46DC-9CC8-DAD5290F7686}" type="datetimeFigureOut">
               <a:rPr lang="en-US" smtClean="0"/>
-              <a:t>1/17/2020</a:t>
+              <a:t>1/29/2020</a:t>
             </a:fld>
             <a:endParaRPr lang="en-US"/>
           </a:p>
@@ -4344,7 +4345,7 @@
           <a:p>
             <a:fld id="{2C1C4E54-FC0F-46DC-9CC8-DAD5290F7686}" type="datetimeFigureOut">
               <a:rPr lang="en-US" smtClean="0"/>
-              <a:t>1/17/2020</a:t>
+              <a:t>1/29/2020</a:t>
             </a:fld>
             <a:endParaRPr lang="en-US"/>
           </a:p>
@@ -4462,7 +4463,7 @@
           <a:p>
             <a:fld id="{2C1C4E54-FC0F-46DC-9CC8-DAD5290F7686}" type="datetimeFigureOut">
               <a:rPr lang="en-US" smtClean="0"/>
-              <a:t>1/17/2020</a:t>
+              <a:t>1/29/2020</a:t>
             </a:fld>
             <a:endParaRPr lang="en-US"/>
           </a:p>
@@ -4557,7 +4558,7 @@
           <a:p>
             <a:fld id="{2C1C4E54-FC0F-46DC-9CC8-DAD5290F7686}" type="datetimeFigureOut">
               <a:rPr lang="en-US" smtClean="0"/>
-              <a:t>1/17/2020</a:t>
+              <a:t>1/29/2020</a:t>
             </a:fld>
             <a:endParaRPr lang="en-US"/>
           </a:p>
@@ -4812,7 +4813,7 @@
           <a:p>
             <a:fld id="{2C1C4E54-FC0F-46DC-9CC8-DAD5290F7686}" type="datetimeFigureOut">
               <a:rPr lang="en-US" smtClean="0"/>
-              <a:t>1/17/2020</a:t>
+              <a:t>1/29/2020</a:t>
             </a:fld>
             <a:endParaRPr lang="en-US"/>
           </a:p>
@@ -5112,7 +5113,7 @@
           <a:p>
             <a:fld id="{2C1C4E54-FC0F-46DC-9CC8-DAD5290F7686}" type="datetimeFigureOut">
               <a:rPr lang="en-US" smtClean="0"/>
-              <a:t>1/17/2020</a:t>
+              <a:t>1/29/2020</a:t>
             </a:fld>
             <a:endParaRPr lang="en-US"/>
           </a:p>
@@ -5346,7 +5347,7 @@
           <a:p>
             <a:fld id="{2C1C4E54-FC0F-46DC-9CC8-DAD5290F7686}" type="datetimeFigureOut">
               <a:rPr lang="en-US" smtClean="0"/>
-              <a:t>1/17/2020</a:t>
+              <a:t>1/29/2020</a:t>
             </a:fld>
             <a:endParaRPr lang="en-US"/>
           </a:p>
@@ -6801,6 +6802,431 @@
       </p:grpSpPr>
       <p:sp>
         <p:nvSpPr>
+          <p:cNvPr id="2" name="TextBox 1">
+            <a:extLst>
+              <a:ext uri="{FF2B5EF4-FFF2-40B4-BE49-F238E27FC236}">
+                <a16:creationId xmlns:a16="http://schemas.microsoft.com/office/drawing/2014/main" id="{9E9DCA87-5644-4B70-913A-80454B3523AE}"/>
+              </a:ext>
+            </a:extLst>
+          </p:cNvPr>
+          <p:cNvSpPr txBox="1"/>
+          <p:nvPr/>
+        </p:nvSpPr>
+        <p:spPr>
+          <a:xfrm>
+            <a:off x="685567" y="1928332"/>
+            <a:ext cx="1993623" cy="369332"/>
+          </a:xfrm>
+          <a:prstGeom prst="rect">
+            <a:avLst/>
+          </a:prstGeom>
+          <a:noFill/>
+        </p:spPr>
+        <p:txBody>
+          <a:bodyPr wrap="none" rtlCol="0">
+            <a:spAutoFit/>
+          </a:bodyPr>
+          <a:lstStyle/>
+          <a:p>
+            <a:r>
+              <a:rPr lang="en-US" dirty="0"/>
+              <a:t>Worker/ Cron Job</a:t>
+            </a:r>
+          </a:p>
+        </p:txBody>
+      </p:sp>
+      <p:sp>
+        <p:nvSpPr>
+          <p:cNvPr id="3" name="TextBox 2">
+            <a:extLst>
+              <a:ext uri="{FF2B5EF4-FFF2-40B4-BE49-F238E27FC236}">
+                <a16:creationId xmlns:a16="http://schemas.microsoft.com/office/drawing/2014/main" id="{39A3E935-7446-4BA9-BE53-E22D7F55562A}"/>
+              </a:ext>
+            </a:extLst>
+          </p:cNvPr>
+          <p:cNvSpPr txBox="1"/>
+          <p:nvPr/>
+        </p:nvSpPr>
+        <p:spPr>
+          <a:xfrm>
+            <a:off x="794983" y="2729753"/>
+            <a:ext cx="1962397" cy="369332"/>
+          </a:xfrm>
+          <a:prstGeom prst="rect">
+            <a:avLst/>
+          </a:prstGeom>
+          <a:noFill/>
+        </p:spPr>
+        <p:txBody>
+          <a:bodyPr wrap="none" rtlCol="0">
+            <a:spAutoFit/>
+          </a:bodyPr>
+          <a:lstStyle/>
+          <a:p>
+            <a:r>
+              <a:rPr lang="en-US" dirty="0"/>
+              <a:t>Generates Models</a:t>
+            </a:r>
+          </a:p>
+        </p:txBody>
+      </p:sp>
+      <p:pic>
+        <p:nvPicPr>
+          <p:cNvPr id="5" name="Graphic 4">
+            <a:extLst>
+              <a:ext uri="{FF2B5EF4-FFF2-40B4-BE49-F238E27FC236}">
+                <a16:creationId xmlns:a16="http://schemas.microsoft.com/office/drawing/2014/main" id="{929D656B-C84E-4A40-B940-273FF0ADD56A}"/>
+              </a:ext>
+            </a:extLst>
+          </p:cNvPr>
+          <p:cNvPicPr>
+            <a:picLocks noChangeAspect="1"/>
+          </p:cNvPicPr>
+          <p:nvPr/>
+        </p:nvPicPr>
+        <p:blipFill>
+          <a:blip r:embed="rId2">
+            <a:extLst>
+              <a:ext uri="{28A0092B-C50C-407E-A947-70E740481C1C}">
+                <a14:useLocalDpi xmlns:a14="http://schemas.microsoft.com/office/drawing/2010/main" val="0"/>
+              </a:ext>
+              <a:ext uri="{96DAC541-7B7A-43D3-8B79-37D633B846F1}">
+                <asvg:svgBlip xmlns:asvg="http://schemas.microsoft.com/office/drawing/2016/SVG/main" r:embed="rId3"/>
+              </a:ext>
+            </a:extLst>
+          </a:blip>
+          <a:stretch>
+            <a:fillRect/>
+          </a:stretch>
+        </p:blipFill>
+        <p:spPr>
+          <a:xfrm>
+            <a:off x="5322378" y="3328332"/>
+            <a:ext cx="944198" cy="944198"/>
+          </a:xfrm>
+          <a:prstGeom prst="rect">
+            <a:avLst/>
+          </a:prstGeom>
+        </p:spPr>
+      </p:pic>
+      <p:pic>
+        <p:nvPicPr>
+          <p:cNvPr id="7" name="Graphic 6">
+            <a:extLst>
+              <a:ext uri="{FF2B5EF4-FFF2-40B4-BE49-F238E27FC236}">
+                <a16:creationId xmlns:a16="http://schemas.microsoft.com/office/drawing/2014/main" id="{E31D3670-C819-4C1E-99F6-8E501C8BB4BE}"/>
+              </a:ext>
+            </a:extLst>
+          </p:cNvPr>
+          <p:cNvPicPr>
+            <a:picLocks noChangeAspect="1"/>
+          </p:cNvPicPr>
+          <p:nvPr/>
+        </p:nvPicPr>
+        <p:blipFill>
+          <a:blip r:embed="rId4">
+            <a:extLst>
+              <a:ext uri="{28A0092B-C50C-407E-A947-70E740481C1C}">
+                <a14:useLocalDpi xmlns:a14="http://schemas.microsoft.com/office/drawing/2010/main" val="0"/>
+              </a:ext>
+              <a:ext uri="{96DAC541-7B7A-43D3-8B79-37D633B846F1}">
+                <asvg:svgBlip xmlns:asvg="http://schemas.microsoft.com/office/drawing/2016/SVG/main" r:embed="rId5"/>
+              </a:ext>
+            </a:extLst>
+          </a:blip>
+          <a:stretch>
+            <a:fillRect/>
+          </a:stretch>
+        </p:blipFill>
+        <p:spPr>
+          <a:xfrm>
+            <a:off x="5322378" y="1564809"/>
+            <a:ext cx="944198" cy="944198"/>
+          </a:xfrm>
+          <a:prstGeom prst="rect">
+            <a:avLst/>
+          </a:prstGeom>
+        </p:spPr>
+      </p:pic>
+      <p:pic>
+        <p:nvPicPr>
+          <p:cNvPr id="9" name="Graphic 8">
+            <a:extLst>
+              <a:ext uri="{FF2B5EF4-FFF2-40B4-BE49-F238E27FC236}">
+                <a16:creationId xmlns:a16="http://schemas.microsoft.com/office/drawing/2014/main" id="{ADE2DF8D-7C45-4427-9B88-47AFC63A95DD}"/>
+              </a:ext>
+            </a:extLst>
+          </p:cNvPr>
+          <p:cNvPicPr>
+            <a:picLocks noChangeAspect="1"/>
+          </p:cNvPicPr>
+          <p:nvPr/>
+        </p:nvPicPr>
+        <p:blipFill>
+          <a:blip r:embed="rId6">
+            <a:extLst>
+              <a:ext uri="{28A0092B-C50C-407E-A947-70E740481C1C}">
+                <a14:useLocalDpi xmlns:a14="http://schemas.microsoft.com/office/drawing/2010/main" val="0"/>
+              </a:ext>
+              <a:ext uri="{96DAC541-7B7A-43D3-8B79-37D633B846F1}">
+                <asvg:svgBlip xmlns:asvg="http://schemas.microsoft.com/office/drawing/2016/SVG/main" r:embed="rId7"/>
+              </a:ext>
+            </a:extLst>
+          </a:blip>
+          <a:stretch>
+            <a:fillRect/>
+          </a:stretch>
+        </p:blipFill>
+        <p:spPr>
+          <a:xfrm>
+            <a:off x="5322378" y="221980"/>
+            <a:ext cx="944198" cy="944198"/>
+          </a:xfrm>
+          <a:prstGeom prst="rect">
+            <a:avLst/>
+          </a:prstGeom>
+        </p:spPr>
+      </p:pic>
+      <p:sp>
+        <p:nvSpPr>
+          <p:cNvPr id="12" name="TextBox 11">
+            <a:extLst>
+              <a:ext uri="{FF2B5EF4-FFF2-40B4-BE49-F238E27FC236}">
+                <a16:creationId xmlns:a16="http://schemas.microsoft.com/office/drawing/2014/main" id="{55D4250E-6FC0-4D63-A657-40F252A2E7C9}"/>
+              </a:ext>
+            </a:extLst>
+          </p:cNvPr>
+          <p:cNvSpPr txBox="1"/>
+          <p:nvPr/>
+        </p:nvSpPr>
+        <p:spPr>
+          <a:xfrm>
+            <a:off x="8909764" y="1852242"/>
+            <a:ext cx="1049711" cy="369332"/>
+          </a:xfrm>
+          <a:prstGeom prst="rect">
+            <a:avLst/>
+          </a:prstGeom>
+          <a:noFill/>
+        </p:spPr>
+        <p:txBody>
+          <a:bodyPr wrap="none" rtlCol="0">
+            <a:spAutoFit/>
+          </a:bodyPr>
+          <a:lstStyle/>
+          <a:p>
+            <a:r>
+              <a:rPr lang="en-US" dirty="0"/>
+              <a:t>Web </a:t>
+            </a:r>
+            <a:r>
+              <a:rPr lang="en-US" dirty="0" err="1"/>
+              <a:t>Api</a:t>
+            </a:r>
+            <a:endParaRPr lang="en-US" dirty="0"/>
+          </a:p>
+        </p:txBody>
+      </p:sp>
+      <p:cxnSp>
+        <p:nvCxnSpPr>
+          <p:cNvPr id="14" name="Straight Arrow Connector 13">
+            <a:extLst>
+              <a:ext uri="{FF2B5EF4-FFF2-40B4-BE49-F238E27FC236}">
+                <a16:creationId xmlns:a16="http://schemas.microsoft.com/office/drawing/2014/main" id="{57886222-6817-4F8A-A0E6-B17BA7757CB2}"/>
+              </a:ext>
+            </a:extLst>
+          </p:cNvPr>
+          <p:cNvCxnSpPr>
+            <a:stCxn id="7" idx="1"/>
+          </p:cNvCxnSpPr>
+          <p:nvPr/>
+        </p:nvCxnSpPr>
+        <p:spPr>
+          <a:xfrm flipH="1">
+            <a:off x="2550253" y="2036908"/>
+            <a:ext cx="2772125" cy="76090"/>
+          </a:xfrm>
+          <a:prstGeom prst="straightConnector1">
+            <a:avLst/>
+          </a:prstGeom>
+          <a:ln>
+            <a:tailEnd type="triangle"/>
+          </a:ln>
+        </p:spPr>
+        <p:style>
+          <a:lnRef idx="1">
+            <a:schemeClr val="accent1"/>
+          </a:lnRef>
+          <a:fillRef idx="0">
+            <a:schemeClr val="accent1"/>
+          </a:fillRef>
+          <a:effectRef idx="0">
+            <a:schemeClr val="accent1"/>
+          </a:effectRef>
+          <a:fontRef idx="minor">
+            <a:schemeClr val="tx1"/>
+          </a:fontRef>
+        </p:style>
+      </p:cxnSp>
+      <p:cxnSp>
+        <p:nvCxnSpPr>
+          <p:cNvPr id="16" name="Straight Arrow Connector 15">
+            <a:extLst>
+              <a:ext uri="{FF2B5EF4-FFF2-40B4-BE49-F238E27FC236}">
+                <a16:creationId xmlns:a16="http://schemas.microsoft.com/office/drawing/2014/main" id="{AE0DC9AC-B9FA-43BD-A857-4176682C6822}"/>
+              </a:ext>
+            </a:extLst>
+          </p:cNvPr>
+          <p:cNvCxnSpPr>
+            <a:stCxn id="7" idx="3"/>
+            <a:endCxn id="12" idx="1"/>
+          </p:cNvCxnSpPr>
+          <p:nvPr/>
+        </p:nvCxnSpPr>
+        <p:spPr>
+          <a:xfrm>
+            <a:off x="6266576" y="2036908"/>
+            <a:ext cx="2643188" cy="0"/>
+          </a:xfrm>
+          <a:prstGeom prst="straightConnector1">
+            <a:avLst/>
+          </a:prstGeom>
+          <a:ln>
+            <a:tailEnd type="triangle"/>
+          </a:ln>
+        </p:spPr>
+        <p:style>
+          <a:lnRef idx="1">
+            <a:schemeClr val="accent1"/>
+          </a:lnRef>
+          <a:fillRef idx="0">
+            <a:schemeClr val="accent1"/>
+          </a:fillRef>
+          <a:effectRef idx="0">
+            <a:schemeClr val="accent1"/>
+          </a:effectRef>
+          <a:fontRef idx="minor">
+            <a:schemeClr val="tx1"/>
+          </a:fontRef>
+        </p:style>
+      </p:cxnSp>
+      <p:cxnSp>
+        <p:nvCxnSpPr>
+          <p:cNvPr id="18" name="Connector: Elbow 17">
+            <a:extLst>
+              <a:ext uri="{FF2B5EF4-FFF2-40B4-BE49-F238E27FC236}">
+                <a16:creationId xmlns:a16="http://schemas.microsoft.com/office/drawing/2014/main" id="{EDB52698-2F4A-46C9-BFCF-0C6F0309AA10}"/>
+              </a:ext>
+            </a:extLst>
+          </p:cNvPr>
+          <p:cNvCxnSpPr>
+            <a:cxnSpLocks/>
+            <a:stCxn id="3" idx="3"/>
+            <a:endCxn id="5" idx="1"/>
+          </p:cNvCxnSpPr>
+          <p:nvPr/>
+        </p:nvCxnSpPr>
+        <p:spPr>
+          <a:xfrm>
+            <a:off x="2757380" y="2914419"/>
+            <a:ext cx="2564998" cy="886012"/>
+          </a:xfrm>
+          <a:prstGeom prst="bentConnector3">
+            <a:avLst/>
+          </a:prstGeom>
+          <a:ln>
+            <a:tailEnd type="triangle"/>
+          </a:ln>
+        </p:spPr>
+        <p:style>
+          <a:lnRef idx="1">
+            <a:schemeClr val="accent1"/>
+          </a:lnRef>
+          <a:fillRef idx="0">
+            <a:schemeClr val="accent1"/>
+          </a:fillRef>
+          <a:effectRef idx="0">
+            <a:schemeClr val="accent1"/>
+          </a:effectRef>
+          <a:fontRef idx="minor">
+            <a:schemeClr val="tx1"/>
+          </a:fontRef>
+        </p:style>
+      </p:cxnSp>
+      <p:cxnSp>
+        <p:nvCxnSpPr>
+          <p:cNvPr id="20" name="Connector: Elbow 19">
+            <a:extLst>
+              <a:ext uri="{FF2B5EF4-FFF2-40B4-BE49-F238E27FC236}">
+                <a16:creationId xmlns:a16="http://schemas.microsoft.com/office/drawing/2014/main" id="{D417D98B-7E7C-4F99-90BA-C9A84BF62D29}"/>
+              </a:ext>
+            </a:extLst>
+          </p:cNvPr>
+          <p:cNvCxnSpPr>
+            <a:stCxn id="5" idx="3"/>
+            <a:endCxn id="12" idx="2"/>
+          </p:cNvCxnSpPr>
+          <p:nvPr/>
+        </p:nvCxnSpPr>
+        <p:spPr>
+          <a:xfrm flipV="1">
+            <a:off x="6266576" y="2221574"/>
+            <a:ext cx="3168044" cy="1578857"/>
+          </a:xfrm>
+          <a:prstGeom prst="bentConnector2">
+            <a:avLst/>
+          </a:prstGeom>
+          <a:ln>
+            <a:tailEnd type="triangle"/>
+          </a:ln>
+        </p:spPr>
+        <p:style>
+          <a:lnRef idx="1">
+            <a:schemeClr val="accent1"/>
+          </a:lnRef>
+          <a:fillRef idx="0">
+            <a:schemeClr val="accent1"/>
+          </a:fillRef>
+          <a:effectRef idx="0">
+            <a:schemeClr val="accent1"/>
+          </a:effectRef>
+          <a:fontRef idx="minor">
+            <a:schemeClr val="tx1"/>
+          </a:fontRef>
+        </p:style>
+      </p:cxnSp>
+    </p:spTree>
+    <p:extLst>
+      <p:ext uri="{BB962C8B-B14F-4D97-AF65-F5344CB8AC3E}">
+        <p14:creationId xmlns:p14="http://schemas.microsoft.com/office/powerpoint/2010/main" val="2336389099"/>
+      </p:ext>
+    </p:extLst>
+  </p:cSld>
+  <p:clrMapOvr>
+    <a:masterClrMapping/>
+  </p:clrMapOvr>
+</p:sld>
+</file>
+
+<file path=ppt/slides/slide3.xml><?xml version="1.0" encoding="utf-8"?>
+<p:sld xmlns:a="http://schemas.openxmlformats.org/drawingml/2006/main" xmlns:r="http://schemas.openxmlformats.org/officeDocument/2006/relationships" xmlns:p="http://schemas.openxmlformats.org/presentationml/2006/main">
+  <p:cSld>
+    <p:spTree>
+      <p:nvGrpSpPr>
+        <p:cNvPr id="1" name=""/>
+        <p:cNvGrpSpPr/>
+        <p:nvPr/>
+      </p:nvGrpSpPr>
+      <p:grpSpPr>
+        <a:xfrm>
+          <a:off x="0" y="0"/>
+          <a:ext cx="0" cy="0"/>
+          <a:chOff x="0" y="0"/>
+          <a:chExt cx="0" cy="0"/>
+        </a:xfrm>
+      </p:grpSpPr>
+      <p:sp>
+        <p:nvSpPr>
           <p:cNvPr id="2" name="Rectangle 1">
             <a:extLst>
               <a:ext uri="{FF2B5EF4-FFF2-40B4-BE49-F238E27FC236}">

</xml_diff>